<commit_message>
mise à jour du rapport
</commit_message>
<xml_diff>
--- a/Soutenance du projet.pptx
+++ b/Soutenance du projet.pptx
@@ -11,7 +11,10 @@
     <p:sldId id="259" r:id="rId5"/>
     <p:sldId id="260" r:id="rId6"/>
     <p:sldId id="261" r:id="rId7"/>
-    <p:sldId id="262" r:id="rId8"/>
+    <p:sldId id="264" r:id="rId8"/>
+    <p:sldId id="263" r:id="rId9"/>
+    <p:sldId id="265" r:id="rId10"/>
+    <p:sldId id="262" r:id="rId11"/>
   </p:sldIdLst>
   <p:sldSz cx="12192000" cy="6858000"/>
   <p:notesSz cx="6858000" cy="9144000"/>
@@ -5923,6 +5926,109 @@
 </p:sld>
 </file>
 
+<file path=ppt/slides/slide10.xml><?xml version="1.0" encoding="utf-8"?>
+<p:sld xmlns:a="http://schemas.openxmlformats.org/drawingml/2006/main" xmlns:r="http://schemas.openxmlformats.org/officeDocument/2006/relationships" xmlns:p="http://schemas.openxmlformats.org/presentationml/2006/main">
+  <p:cSld>
+    <p:spTree>
+      <p:nvGrpSpPr>
+        <p:cNvPr id="1" name=""/>
+        <p:cNvGrpSpPr/>
+        <p:nvPr/>
+      </p:nvGrpSpPr>
+      <p:grpSpPr>
+        <a:xfrm>
+          <a:off x="0" y="0"/>
+          <a:ext cx="0" cy="0"/>
+          <a:chOff x="0" y="0"/>
+          <a:chExt cx="0" cy="0"/>
+        </a:xfrm>
+      </p:grpSpPr>
+      <p:sp>
+        <p:nvSpPr>
+          <p:cNvPr id="2" name="Titre 1"/>
+          <p:cNvSpPr>
+            <a:spLocks noGrp="1"/>
+          </p:cNvSpPr>
+          <p:nvPr>
+            <p:ph type="title"/>
+          </p:nvPr>
+        </p:nvSpPr>
+        <p:spPr/>
+        <p:txBody>
+          <a:bodyPr/>
+          <a:lstStyle/>
+          <a:p>
+            <a:r>
+              <a:rPr lang="fr-FR" dirty="0" smtClean="0"/>
+              <a:t>Apports</a:t>
+            </a:r>
+            <a:endParaRPr lang="en-GB" dirty="0"/>
+          </a:p>
+        </p:txBody>
+      </p:sp>
+      <p:sp>
+        <p:nvSpPr>
+          <p:cNvPr id="3" name="Espace réservé du contenu 2"/>
+          <p:cNvSpPr>
+            <a:spLocks noGrp="1"/>
+          </p:cNvSpPr>
+          <p:nvPr>
+            <p:ph idx="1"/>
+          </p:nvPr>
+        </p:nvSpPr>
+        <p:spPr/>
+        <p:txBody>
+          <a:bodyPr/>
+          <a:lstStyle/>
+          <a:p>
+            <a:r>
+              <a:rPr lang="fr-FR" sz="2400" dirty="0" smtClean="0"/>
+              <a:t>Application et approfondissement de nos connaissances en langage web</a:t>
+            </a:r>
+          </a:p>
+          <a:p>
+            <a:r>
+              <a:rPr lang="fr-FR" sz="2400" dirty="0" smtClean="0"/>
+              <a:t>Connaissance des étapes du développement d’un site web dynamique</a:t>
+            </a:r>
+          </a:p>
+          <a:p>
+            <a:r>
+              <a:rPr lang="fr-FR" sz="2400" dirty="0" smtClean="0"/>
+              <a:t>Optimisation du travail d’équipe</a:t>
+            </a:r>
+          </a:p>
+          <a:p>
+            <a:r>
+              <a:rPr lang="fr-FR" sz="2400" dirty="0" smtClean="0"/>
+              <a:t>Vision précise de la branche ISI</a:t>
+            </a:r>
+          </a:p>
+          <a:p>
+            <a:endParaRPr lang="en-GB" dirty="0"/>
+          </a:p>
+        </p:txBody>
+      </p:sp>
+    </p:spTree>
+    <p:extLst>
+      <p:ext uri="{BB962C8B-B14F-4D97-AF65-F5344CB8AC3E}">
+        <p14:creationId xmlns:p14="http://schemas.microsoft.com/office/powerpoint/2010/main" val="3998498818"/>
+      </p:ext>
+    </p:extLst>
+  </p:cSld>
+  <p:clrMapOvr>
+    <a:masterClrMapping/>
+  </p:clrMapOvr>
+  <p:timing>
+    <p:tnLst>
+      <p:par>
+        <p:cTn id="1" dur="indefinite" restart="never" nodeType="tmRoot"/>
+      </p:par>
+    </p:tnLst>
+  </p:timing>
+</p:sld>
+</file>
+
 <file path=ppt/slides/slide2.xml><?xml version="1.0" encoding="utf-8"?>
 <p:sld xmlns:a="http://schemas.openxmlformats.org/drawingml/2006/main" xmlns:r="http://schemas.openxmlformats.org/officeDocument/2006/relationships" xmlns:p="http://schemas.openxmlformats.org/presentationml/2006/main">
   <p:cSld>
@@ -6103,7 +6209,7 @@
           <a:p>
             <a:r>
               <a:rPr lang="fr-FR" dirty="0" smtClean="0"/>
-              <a:t>Problématique (objectif ?)</a:t>
+              <a:t>Problématique</a:t>
             </a:r>
             <a:endParaRPr lang="en-GB" dirty="0"/>
           </a:p>
@@ -6433,19 +6539,19 @@
       </p:sp>
       <p:pic>
         <p:nvPicPr>
-          <p:cNvPr id="4" name="Image 3"/>
+          <p:cNvPr id="5" name="Image 4"/>
           <p:cNvPicPr/>
           <p:nvPr/>
         </p:nvPicPr>
         <p:blipFill rotWithShape="1">
           <a:blip r:embed="rId2"/>
-          <a:srcRect l="18684" t="16762" r="18981" b="10605"/>
+          <a:srcRect l="16369" t="22055" r="15674" b="6783"/>
           <a:stretch/>
         </p:blipFill>
         <p:spPr bwMode="auto">
           <a:xfrm>
-            <a:off x="1695933" y="2154449"/>
-            <a:ext cx="6752608" cy="4423583"/>
+            <a:off x="1740386" y="2145354"/>
+            <a:ext cx="7643756" cy="4500143"/>
           </a:xfrm>
           <a:prstGeom prst="rect">
             <a:avLst/>
@@ -6548,6 +6654,13 @@
           </a:p>
           <a:p>
             <a:r>
+              <a:rPr lang="fr-FR" sz="2400" dirty="0" err="1" smtClean="0"/>
+              <a:t>MySQLWorkbench</a:t>
+            </a:r>
+            <a:endParaRPr lang="fr-FR" sz="2400" dirty="0" smtClean="0"/>
+          </a:p>
+          <a:p>
+            <a:r>
               <a:rPr lang="fr-FR" sz="2400" dirty="0" smtClean="0"/>
               <a:t>Git</a:t>
             </a:r>
@@ -6625,25 +6738,54 @@
           </a:p>
         </p:txBody>
       </p:sp>
-      <p:sp>
-        <p:nvSpPr>
-          <p:cNvPr id="3" name="Espace réservé du contenu 2"/>
-          <p:cNvSpPr>
-            <a:spLocks noGrp="1"/>
-          </p:cNvSpPr>
+      <p:pic>
+        <p:nvPicPr>
+          <p:cNvPr id="4" name="Espace réservé du contenu 3"/>
+          <p:cNvPicPr>
+            <a:picLocks noGrp="1" noChangeAspect="1"/>
+          </p:cNvPicPr>
           <p:nvPr>
             <p:ph idx="1"/>
           </p:nvPr>
-        </p:nvSpPr>
-        <p:spPr/>
-        <p:txBody>
-          <a:bodyPr/>
-          <a:lstStyle/>
-          <a:p>
-            <a:endParaRPr lang="en-GB"/>
-          </a:p>
-        </p:txBody>
-      </p:sp>
+        </p:nvPicPr>
+        <p:blipFill rotWithShape="1">
+          <a:blip r:embed="rId2"/>
+          <a:srcRect l="2918" t="11028" r="3245" b="5356"/>
+          <a:stretch/>
+        </p:blipFill>
+        <p:spPr>
+          <a:xfrm>
+            <a:off x="90152" y="1505398"/>
+            <a:ext cx="5924281" cy="2968029"/>
+          </a:xfrm>
+          <a:prstGeom prst="rect">
+            <a:avLst/>
+          </a:prstGeom>
+        </p:spPr>
+      </p:pic>
+      <p:pic>
+        <p:nvPicPr>
+          <p:cNvPr id="5" name="Image 4"/>
+          <p:cNvPicPr>
+            <a:picLocks noChangeAspect="1"/>
+          </p:cNvPicPr>
+          <p:nvPr/>
+        </p:nvPicPr>
+        <p:blipFill rotWithShape="1">
+          <a:blip r:embed="rId3"/>
+          <a:srcRect l="10729" t="11400" r="7144" b="11345"/>
+          <a:stretch/>
+        </p:blipFill>
+        <p:spPr>
+          <a:xfrm>
+            <a:off x="6353333" y="3657600"/>
+            <a:ext cx="5736171" cy="3033690"/>
+          </a:xfrm>
+          <a:prstGeom prst="rect">
+            <a:avLst/>
+          </a:prstGeom>
+        </p:spPr>
+      </p:pic>
     </p:spTree>
     <p:extLst>
       <p:ext uri="{BB962C8B-B14F-4D97-AF65-F5344CB8AC3E}">
@@ -6681,76 +6823,190 @@
           <a:chExt cx="0" cy="0"/>
         </a:xfrm>
       </p:grpSpPr>
-      <p:sp>
-        <p:nvSpPr>
-          <p:cNvPr id="2" name="Titre 1"/>
-          <p:cNvSpPr>
-            <a:spLocks noGrp="1"/>
-          </p:cNvSpPr>
-          <p:nvPr>
-            <p:ph type="title"/>
-          </p:nvPr>
-        </p:nvSpPr>
-        <p:spPr/>
-        <p:txBody>
-          <a:bodyPr/>
-          <a:lstStyle/>
-          <a:p>
-            <a:r>
-              <a:rPr lang="fr-FR" dirty="0" smtClean="0"/>
-              <a:t>Apports</a:t>
-            </a:r>
-            <a:endParaRPr lang="en-GB" dirty="0"/>
-          </a:p>
-        </p:txBody>
-      </p:sp>
-      <p:sp>
-        <p:nvSpPr>
-          <p:cNvPr id="3" name="Espace réservé du contenu 2"/>
-          <p:cNvSpPr>
-            <a:spLocks noGrp="1"/>
-          </p:cNvSpPr>
-          <p:nvPr>
-            <p:ph idx="1"/>
-          </p:nvPr>
-        </p:nvSpPr>
-        <p:spPr/>
-        <p:txBody>
-          <a:bodyPr/>
-          <a:lstStyle/>
-          <a:p>
-            <a:r>
-              <a:rPr lang="fr-FR" sz="2400" dirty="0" smtClean="0"/>
-              <a:t>Application et approfondissement de nos connaissances en langage web</a:t>
-            </a:r>
-          </a:p>
-          <a:p>
-            <a:r>
-              <a:rPr lang="fr-FR" sz="2400" dirty="0" smtClean="0"/>
-              <a:t>Connaissance des étapes du développement d’un site web dynamique</a:t>
-            </a:r>
-          </a:p>
-          <a:p>
-            <a:r>
-              <a:rPr lang="fr-FR" sz="2400" dirty="0" smtClean="0"/>
-              <a:t>Optimisation du travail d’équipe</a:t>
-            </a:r>
-          </a:p>
-          <a:p>
-            <a:r>
-              <a:rPr lang="fr-FR" sz="2400" dirty="0" smtClean="0"/>
-              <a:t>Vision précise de la branche ISI</a:t>
-            </a:r>
-          </a:p>
-          <a:p>
-            <a:endParaRPr lang="en-GB" dirty="0"/>
-          </a:p>
-        </p:txBody>
-      </p:sp>
+      <p:pic>
+        <p:nvPicPr>
+          <p:cNvPr id="4" name="Picture"/>
+          <p:cNvPicPr/>
+          <p:nvPr/>
+        </p:nvPicPr>
+        <p:blipFill>
+          <a:blip r:embed="rId2"/>
+          <a:srcRect/>
+          <a:stretch>
+            <a:fillRect/>
+          </a:stretch>
+        </p:blipFill>
+        <p:spPr bwMode="auto">
+          <a:xfrm>
+            <a:off x="1493951" y="261817"/>
+            <a:ext cx="8783390" cy="6222004"/>
+          </a:xfrm>
+          <a:prstGeom prst="rect">
+            <a:avLst/>
+          </a:prstGeom>
+          <a:noFill/>
+          <a:ln w="9525">
+            <a:noFill/>
+            <a:miter lim="800000"/>
+            <a:headEnd/>
+            <a:tailEnd/>
+          </a:ln>
+        </p:spPr>
+      </p:pic>
     </p:spTree>
     <p:extLst>
       <p:ext uri="{BB962C8B-B14F-4D97-AF65-F5344CB8AC3E}">
-        <p14:creationId xmlns:p14="http://schemas.microsoft.com/office/powerpoint/2010/main" val="3998498818"/>
+        <p14:creationId xmlns:p14="http://schemas.microsoft.com/office/powerpoint/2010/main" val="317243919"/>
+      </p:ext>
+    </p:extLst>
+  </p:cSld>
+  <p:clrMapOvr>
+    <a:masterClrMapping/>
+  </p:clrMapOvr>
+  <p:timing>
+    <p:tnLst>
+      <p:par>
+        <p:cTn id="1" dur="indefinite" restart="never" nodeType="tmRoot"/>
+      </p:par>
+    </p:tnLst>
+  </p:timing>
+</p:sld>
+</file>
+
+<file path=ppt/slides/slide8.xml><?xml version="1.0" encoding="utf-8"?>
+<p:sld xmlns:a="http://schemas.openxmlformats.org/drawingml/2006/main" xmlns:r="http://schemas.openxmlformats.org/officeDocument/2006/relationships" xmlns:p="http://schemas.openxmlformats.org/presentationml/2006/main">
+  <p:cSld>
+    <p:spTree>
+      <p:nvGrpSpPr>
+        <p:cNvPr id="1" name=""/>
+        <p:cNvGrpSpPr/>
+        <p:nvPr/>
+      </p:nvGrpSpPr>
+      <p:grpSpPr>
+        <a:xfrm>
+          <a:off x="0" y="0"/>
+          <a:ext cx="0" cy="0"/>
+          <a:chOff x="0" y="0"/>
+          <a:chExt cx="0" cy="0"/>
+        </a:xfrm>
+      </p:grpSpPr>
+      <p:pic>
+        <p:nvPicPr>
+          <p:cNvPr id="2" name="Image 1"/>
+          <p:cNvPicPr>
+            <a:picLocks noChangeAspect="1"/>
+          </p:cNvPicPr>
+          <p:nvPr/>
+        </p:nvPicPr>
+        <p:blipFill rotWithShape="1">
+          <a:blip r:embed="rId2"/>
+          <a:srcRect l="2851" t="11048" r="10044" b="6910"/>
+          <a:stretch/>
+        </p:blipFill>
+        <p:spPr>
+          <a:xfrm>
+            <a:off x="502330" y="321972"/>
+            <a:ext cx="6235677" cy="3302074"/>
+          </a:xfrm>
+          <a:prstGeom prst="rect">
+            <a:avLst/>
+          </a:prstGeom>
+        </p:spPr>
+      </p:pic>
+      <p:pic>
+        <p:nvPicPr>
+          <p:cNvPr id="3" name="Image 2"/>
+          <p:cNvPicPr>
+            <a:picLocks noChangeAspect="1"/>
+          </p:cNvPicPr>
+          <p:nvPr/>
+        </p:nvPicPr>
+        <p:blipFill rotWithShape="1">
+          <a:blip r:embed="rId3"/>
+          <a:srcRect l="1664" t="10871" r="5887" b="7614"/>
+          <a:stretch/>
+        </p:blipFill>
+        <p:spPr>
+          <a:xfrm>
+            <a:off x="5630128" y="3624047"/>
+            <a:ext cx="6302955" cy="3124484"/>
+          </a:xfrm>
+          <a:prstGeom prst="rect">
+            <a:avLst/>
+          </a:prstGeom>
+        </p:spPr>
+      </p:pic>
+    </p:spTree>
+    <p:extLst>
+      <p:ext uri="{BB962C8B-B14F-4D97-AF65-F5344CB8AC3E}">
+        <p14:creationId xmlns:p14="http://schemas.microsoft.com/office/powerpoint/2010/main" val="3738891854"/>
+      </p:ext>
+    </p:extLst>
+  </p:cSld>
+  <p:clrMapOvr>
+    <a:masterClrMapping/>
+  </p:clrMapOvr>
+  <p:timing>
+    <p:tnLst>
+      <p:par>
+        <p:cTn id="1" dur="indefinite" restart="never" nodeType="tmRoot"/>
+      </p:par>
+    </p:tnLst>
+  </p:timing>
+</p:sld>
+</file>
+
+<file path=ppt/slides/slide9.xml><?xml version="1.0" encoding="utf-8"?>
+<p:sld xmlns:a="http://schemas.openxmlformats.org/drawingml/2006/main" xmlns:r="http://schemas.openxmlformats.org/officeDocument/2006/relationships" xmlns:p="http://schemas.openxmlformats.org/presentationml/2006/main">
+  <p:cSld>
+    <p:spTree>
+      <p:nvGrpSpPr>
+        <p:cNvPr id="1" name=""/>
+        <p:cNvGrpSpPr/>
+        <p:nvPr/>
+      </p:nvGrpSpPr>
+      <p:grpSpPr>
+        <a:xfrm>
+          <a:off x="0" y="0"/>
+          <a:ext cx="0" cy="0"/>
+          <a:chOff x="0" y="0"/>
+          <a:chExt cx="0" cy="0"/>
+        </a:xfrm>
+      </p:grpSpPr>
+      <p:pic>
+        <p:nvPicPr>
+          <p:cNvPr id="2" name="Picture"/>
+          <p:cNvPicPr/>
+          <p:nvPr/>
+        </p:nvPicPr>
+        <p:blipFill>
+          <a:blip r:embed="rId2"/>
+          <a:srcRect/>
+          <a:stretch>
+            <a:fillRect/>
+          </a:stretch>
+        </p:blipFill>
+        <p:spPr bwMode="auto">
+          <a:xfrm>
+            <a:off x="141668" y="592430"/>
+            <a:ext cx="11914026" cy="5396245"/>
+          </a:xfrm>
+          <a:prstGeom prst="rect">
+            <a:avLst/>
+          </a:prstGeom>
+          <a:noFill/>
+          <a:ln w="9525">
+            <a:noFill/>
+            <a:miter lim="800000"/>
+            <a:headEnd/>
+            <a:tailEnd/>
+          </a:ln>
+        </p:spPr>
+      </p:pic>
+    </p:spTree>
+    <p:extLst>
+      <p:ext uri="{BB962C8B-B14F-4D97-AF65-F5344CB8AC3E}">
+        <p14:creationId xmlns:p14="http://schemas.microsoft.com/office/powerpoint/2010/main" val="801267204"/>
       </p:ext>
     </p:extLst>
   </p:cSld>

</xml_diff>